<commit_message>
small formatting changes to pres
</commit_message>
<xml_diff>
--- a/doc/D2_presentation.pptx
+++ b/doc/D2_presentation.pptx
@@ -6374,7 +6374,7 @@
             </a:r>
             <a:r>
               <a:rPr lang="en-US" sz="2400" i="0" dirty="0"/>
-              <a:t> word vectors trained on common crawl</a:t>
+              <a:t> word vectors trained on Common Crawl</a:t>
             </a:r>
           </a:p>
           <a:p>
@@ -7467,7 +7467,7 @@
           <a:p>
             <a:r>
               <a:rPr lang="en-US" sz="2800" dirty="0"/>
-              <a:t>Remove excess Verbiage</a:t>
+              <a:t>Remove excess verbiage</a:t>
             </a:r>
           </a:p>
           <a:p>

</xml_diff>

<commit_message>
changed Columbine! to Grizzly bear
</commit_message>
<xml_diff>
--- a/doc/D2_presentation.pptx
+++ b/doc/D2_presentation.pptx
@@ -219,7 +219,7 @@
           <a:p>
             <a:fld id="{9A0D9DA0-D7DA-4183-84DC-AA8105A910F4}" type="datetimeFigureOut">
               <a:rPr lang="en-US" smtClean="0"/>
-              <a:t>4/28/2020</a:t>
+              <a:t>4/29/2020</a:t>
             </a:fld>
             <a:endParaRPr lang="en-US"/>
           </a:p>
@@ -939,7 +939,7 @@
             <a:fld id="{B61BEF0D-F0BB-DE4B-95CE-6DB70DBA9567}" type="datetimeFigureOut">
               <a:rPr lang="en-US" smtClean="0"/>
               <a:pPr/>
-              <a:t>4/28/2020</a:t>
+              <a:t>4/29/2020</a:t>
             </a:fld>
             <a:endParaRPr lang="en-US" dirty="0"/>
           </a:p>
@@ -1271,7 +1271,7 @@
             <a:fld id="{B61BEF0D-F0BB-DE4B-95CE-6DB70DBA9567}" type="datetimeFigureOut">
               <a:rPr lang="en-US" smtClean="0"/>
               <a:pPr/>
-              <a:t>4/28/2020</a:t>
+              <a:t>4/29/2020</a:t>
             </a:fld>
             <a:endParaRPr lang="en-US" dirty="0"/>
           </a:p>
@@ -1453,7 +1453,7 @@
             <a:fld id="{B61BEF0D-F0BB-DE4B-95CE-6DB70DBA9567}" type="datetimeFigureOut">
               <a:rPr lang="en-US" smtClean="0"/>
               <a:pPr/>
-              <a:t>4/28/2020</a:t>
+              <a:t>4/29/2020</a:t>
             </a:fld>
             <a:endParaRPr lang="en-US" dirty="0"/>
           </a:p>
@@ -1625,7 +1625,7 @@
             <a:fld id="{B61BEF0D-F0BB-DE4B-95CE-6DB70DBA9567}" type="datetimeFigureOut">
               <a:rPr lang="en-US" smtClean="0"/>
               <a:pPr/>
-              <a:t>4/28/2020</a:t>
+              <a:t>4/29/2020</a:t>
             </a:fld>
             <a:endParaRPr lang="en-US" dirty="0"/>
           </a:p>
@@ -1904,7 +1904,7 @@
             <a:fld id="{B61BEF0D-F0BB-DE4B-95CE-6DB70DBA9567}" type="datetimeFigureOut">
               <a:rPr lang="en-US" smtClean="0"/>
               <a:pPr/>
-              <a:t>4/28/2020</a:t>
+              <a:t>4/29/2020</a:t>
             </a:fld>
             <a:endParaRPr lang="en-US" dirty="0"/>
           </a:p>
@@ -2300,7 +2300,7 @@
             <a:fld id="{B61BEF0D-F0BB-DE4B-95CE-6DB70DBA9567}" type="datetimeFigureOut">
               <a:rPr lang="en-US" smtClean="0"/>
               <a:pPr/>
-              <a:t>4/28/2020</a:t>
+              <a:t>4/29/2020</a:t>
             </a:fld>
             <a:endParaRPr lang="en-US" dirty="0"/>
           </a:p>
@@ -2779,7 +2779,7 @@
             <a:fld id="{B61BEF0D-F0BB-DE4B-95CE-6DB70DBA9567}" type="datetimeFigureOut">
               <a:rPr lang="en-US" smtClean="0"/>
               <a:pPr/>
-              <a:t>4/28/2020</a:t>
+              <a:t>4/29/2020</a:t>
             </a:fld>
             <a:endParaRPr lang="en-US" dirty="0"/>
           </a:p>
@@ -2899,7 +2899,7 @@
             <a:fld id="{B61BEF0D-F0BB-DE4B-95CE-6DB70DBA9567}" type="datetimeFigureOut">
               <a:rPr lang="en-US" smtClean="0"/>
               <a:pPr/>
-              <a:t>4/28/2020</a:t>
+              <a:t>4/29/2020</a:t>
             </a:fld>
             <a:endParaRPr lang="en-US" dirty="0"/>
           </a:p>
@@ -2996,7 +2996,7 @@
             <a:fld id="{B61BEF0D-F0BB-DE4B-95CE-6DB70DBA9567}" type="datetimeFigureOut">
               <a:rPr lang="en-US" smtClean="0"/>
               <a:pPr/>
-              <a:t>4/28/2020</a:t>
+              <a:t>4/29/2020</a:t>
             </a:fld>
             <a:endParaRPr lang="en-US" dirty="0"/>
           </a:p>
@@ -3344,7 +3344,7 @@
             <a:fld id="{B61BEF0D-F0BB-DE4B-95CE-6DB70DBA9567}" type="datetimeFigureOut">
               <a:rPr lang="en-US" smtClean="0"/>
               <a:pPr/>
-              <a:t>4/28/2020</a:t>
+              <a:t>4/29/2020</a:t>
             </a:fld>
             <a:endParaRPr lang="en-US" dirty="0"/>
           </a:p>
@@ -3734,7 +3734,7 @@
             <a:fld id="{B61BEF0D-F0BB-DE4B-95CE-6DB70DBA9567}" type="datetimeFigureOut">
               <a:rPr lang="en-US" smtClean="0"/>
               <a:pPr/>
-              <a:t>4/28/2020</a:t>
+              <a:t>4/29/2020</a:t>
             </a:fld>
             <a:endParaRPr lang="en-US" dirty="0"/>
           </a:p>
@@ -4014,7 +4014,7 @@
             <a:fld id="{B61BEF0D-F0BB-DE4B-95CE-6DB70DBA9567}" type="datetimeFigureOut">
               <a:rPr lang="en-US" smtClean="0"/>
               <a:pPr/>
-              <a:t>4/28/2020</a:t>
+              <a:t>4/29/2020</a:t>
             </a:fld>
             <a:endParaRPr lang="en-US" dirty="0"/>
           </a:p>
@@ -8837,7 +8837,7 @@
             <a:pPr lvl="1"/>
             <a:r>
               <a:rPr lang="en-US" sz="2400" i="0" dirty="0"/>
-              <a:t>“Columbine!”</a:t>
+              <a:t>“Grizzly bear”</a:t>
             </a:r>
           </a:p>
           <a:p>

</xml_diff>